<commit_message>
Ajout du rapport et liens pour les notebooks
</commit_message>
<xml_diff>
--- a/doc/fr/Figures/MilestonesRoadmap.pptx
+++ b/doc/fr/Figures/MilestonesRoadmap.pptx
@@ -215,7 +215,7 @@
           <a:p>
             <a:fld id="{6A541A70-3912-4AB9-AFD6-255783BA5251}" type="datetimeFigureOut">
               <a:rPr lang="en-US" smtClean="0"/>
-              <a:t>17-Aug-20</a:t>
+              <a:t>20-Aug-20</a:t>
             </a:fld>
             <a:endParaRPr lang="en-US" dirty="0"/>
           </a:p>
@@ -392,7 +392,7 @@
           <a:p>
             <a:fld id="{B9D7F07F-B36A-4ACE-AFA1-B088790A3DCB}" type="datetimeFigureOut">
               <a:rPr lang="en-US" smtClean="0"/>
-              <a:t>17-Aug-20</a:t>
+              <a:t>20-Aug-20</a:t>
             </a:fld>
             <a:endParaRPr lang="en-US" dirty="0"/>
           </a:p>
@@ -1853,8 +1853,8 @@
                 <a:rPr lang="fr-FR" sz="2000" b="1" dirty="0">
                   <a:solidFill>
                     <a:schemeClr val="tx1">
-                      <a:lumMod val="75000"/>
-                      <a:lumOff val="25000"/>
+                      <a:lumMod val="95000"/>
+                      <a:lumOff val="5000"/>
                     </a:schemeClr>
                   </a:solidFill>
                 </a:rPr>
@@ -2002,7 +2002,73 @@
                       </a:schemeClr>
                     </a:solidFill>
                   </a:rPr>
-                  <a:t>Correction du problème du créneau apparaissant sur E, F, et T. Début de la génération des données.</a:t>
+                  <a:t>Correction du problème du créneau indésirable sur </a:t>
+                </a:r>
+                <a:r>
+                  <a:rPr lang="fr-FR" sz="700" i="1" dirty="0">
+                    <a:solidFill>
+                      <a:schemeClr val="tx1">
+                        <a:lumMod val="75000"/>
+                        <a:lumOff val="25000"/>
+                      </a:schemeClr>
+                    </a:solidFill>
+                  </a:rPr>
+                  <a:t>E</a:t>
+                </a:r>
+                <a:r>
+                  <a:rPr lang="fr-FR" sz="700" dirty="0">
+                    <a:solidFill>
+                      <a:schemeClr val="tx1">
+                        <a:lumMod val="75000"/>
+                        <a:lumOff val="25000"/>
+                      </a:schemeClr>
+                    </a:solidFill>
+                  </a:rPr>
+                  <a:t>, </a:t>
+                </a:r>
+                <a:r>
+                  <a:rPr lang="fr-FR" sz="700" b="1" dirty="0">
+                    <a:solidFill>
+                      <a:schemeClr val="tx1">
+                        <a:lumMod val="75000"/>
+                        <a:lumOff val="25000"/>
+                      </a:schemeClr>
+                    </a:solidFill>
+                  </a:rPr>
+                  <a:t>F</a:t>
+                </a:r>
+                <a:r>
+                  <a:rPr lang="fr-FR" sz="700" dirty="0">
+                    <a:solidFill>
+                      <a:schemeClr val="tx1">
+                        <a:lumMod val="75000"/>
+                        <a:lumOff val="25000"/>
+                      </a:schemeClr>
+                    </a:solidFill>
+                  </a:rPr>
+                  <a:t>, et </a:t>
+                </a:r>
+                <a:r>
+                  <a:rPr lang="fr-FR" sz="700" i="1" dirty="0">
+                    <a:solidFill>
+                      <a:schemeClr val="tx1">
+                        <a:lumMod val="75000"/>
+                        <a:lumOff val="25000"/>
+                      </a:schemeClr>
+                    </a:solidFill>
+                  </a:rPr>
+                  <a:t>T</a:t>
+                </a:r>
+                <a:r>
+                  <a:rPr lang="fr-FR" sz="700" dirty="0">
+                    <a:solidFill>
+                      <a:schemeClr val="tx1">
+                        <a:lumMod val="75000"/>
+                        <a:lumOff val="25000"/>
+                      </a:schemeClr>
+                    </a:solidFill>
+                  </a:rPr>
+                  <a:t>. Début de la génération des données.</a:t>
                 </a:r>
               </a:p>
             </p:txBody>
@@ -2574,6 +2640,17 @@
               <a:lstStyle/>
               <a:p>
                 <a:r>
+                  <a:rPr lang="en-US" sz="1600" dirty="0">
+                    <a:solidFill>
+                      <a:schemeClr val="tx1">
+                        <a:lumMod val="75000"/>
+                        <a:lumOff val="25000"/>
+                      </a:schemeClr>
+                    </a:solidFill>
+                  </a:rPr>
+                  <a:t>Simulation</a:t>
+                </a:r>
+                <a:r>
                   <a:rPr lang="fr-FR" sz="1600" dirty="0">
                     <a:solidFill>
                       <a:schemeClr val="tx1">
@@ -2582,7 +2659,7 @@
                       </a:schemeClr>
                     </a:solidFill>
                   </a:rPr>
-                  <a:t>Modélisation 2D</a:t>
+                  <a:t> 2D</a:t>
                 </a:r>
               </a:p>
             </p:txBody>
@@ -3681,8 +3758,8 @@
               <a:rPr lang="fr-FR" sz="2000" b="1" dirty="0">
                 <a:solidFill>
                   <a:schemeClr val="tx1">
-                    <a:lumMod val="75000"/>
-                    <a:lumOff val="25000"/>
+                    <a:lumMod val="95000"/>
+                    <a:lumOff val="5000"/>
                   </a:schemeClr>
                 </a:solidFill>
               </a:rPr>
@@ -3724,8 +3801,8 @@
               <a:rPr lang="fr-FR" sz="2000" b="1" dirty="0">
                 <a:solidFill>
                   <a:schemeClr val="tx1">
-                    <a:lumMod val="75000"/>
-                    <a:lumOff val="25000"/>
+                    <a:lumMod val="95000"/>
+                    <a:lumOff val="5000"/>
                   </a:schemeClr>
                 </a:solidFill>
               </a:rPr>
@@ -3767,8 +3844,8 @@
               <a:rPr lang="fr-FR" sz="2000" b="1" dirty="0">
                 <a:solidFill>
                   <a:schemeClr val="tx1">
-                    <a:lumMod val="75000"/>
-                    <a:lumOff val="25000"/>
+                    <a:lumMod val="95000"/>
+                    <a:lumOff val="5000"/>
                   </a:schemeClr>
                 </a:solidFill>
               </a:rPr>
@@ -4226,7 +4303,7 @@
                     </a:schemeClr>
                   </a:solidFill>
                 </a:rPr>
-                <a:t>Succès de l’apprentissage 2D après simplification majeures des entrées et du modèle</a:t>
+                <a:t>Succès de l’apprentissage 2D après simplification majeures du modèle et de ses entrées</a:t>
               </a:r>
               <a:r>
                 <a:rPr lang="en-US" sz="700" dirty="0">
@@ -5303,12 +5380,11 @@
 </file>
 
 <file path=customXml/item1.xml><?xml version="1.0" encoding="utf-8"?>
-<?mso-contentType ?>
-<FormTemplates xmlns="http://schemas.microsoft.com/sharepoint/v3/contenttype/forms">
-  <Display>DocumentLibraryForm</Display>
-  <Edit>DocumentLibraryForm</Edit>
-  <New>DocumentLibraryForm</New>
-</FormTemplates>
+<p:properties xmlns:p="http://schemas.microsoft.com/office/2006/metadata/properties" xmlns:xsi="http://www.w3.org/2001/XMLSchema-instance" xmlns:pc="http://schemas.microsoft.com/office/infopath/2007/PartnerControls">
+  <documentManagement>
+    <MediaServiceKeyPoints xmlns="71af3243-3dd4-4a8d-8c0d-dd76da1f02a5" xsi:nil="true"/>
+  </documentManagement>
+</p:properties>
 </file>
 
 <file path=customXml/item2.xml><?xml version="1.0" encoding="utf-8"?>
@@ -5523,17 +5599,20 @@
 </file>
 
 <file path=customXml/item3.xml><?xml version="1.0" encoding="utf-8"?>
-<p:properties xmlns:p="http://schemas.microsoft.com/office/2006/metadata/properties" xmlns:xsi="http://www.w3.org/2001/XMLSchema-instance" xmlns:pc="http://schemas.microsoft.com/office/infopath/2007/PartnerControls">
-  <documentManagement>
-    <MediaServiceKeyPoints xmlns="71af3243-3dd4-4a8d-8c0d-dd76da1f02a5" xsi:nil="true"/>
-  </documentManagement>
-</p:properties>
+<?mso-contentType ?>
+<FormTemplates xmlns="http://schemas.microsoft.com/sharepoint/v3/contenttype/forms">
+  <Display>DocumentLibraryForm</Display>
+  <Edit>DocumentLibraryForm</Edit>
+  <New>DocumentLibraryForm</New>
+</FormTemplates>
 </file>
 
 <file path=customXml/itemProps1.xml><?xml version="1.0" encoding="utf-8"?>
-<ds:datastoreItem xmlns:ds="http://schemas.openxmlformats.org/officeDocument/2006/customXml" ds:itemID="{4FBDE712-7F9D-4A1B-8183-684BCD9655CC}">
+<ds:datastoreItem xmlns:ds="http://schemas.openxmlformats.org/officeDocument/2006/customXml" ds:itemID="{055640B5-C54C-4D0E-87E4-630D201D26AB}">
   <ds:schemaRefs>
-    <ds:schemaRef ds:uri="http://schemas.microsoft.com/sharepoint/v3/contenttype/forms"/>
+    <ds:schemaRef ds:uri="http://schemas.microsoft.com/office/2006/metadata/properties"/>
+    <ds:schemaRef ds:uri="http://schemas.microsoft.com/office/infopath/2007/PartnerControls"/>
+    <ds:schemaRef ds:uri="71af3243-3dd4-4a8d-8c0d-dd76da1f02a5"/>
   </ds:schemaRefs>
 </ds:datastoreItem>
 </file>
@@ -5558,11 +5637,9 @@
 </file>
 
 <file path=customXml/itemProps3.xml><?xml version="1.0" encoding="utf-8"?>
-<ds:datastoreItem xmlns:ds="http://schemas.openxmlformats.org/officeDocument/2006/customXml" ds:itemID="{055640B5-C54C-4D0E-87E4-630D201D26AB}">
+<ds:datastoreItem xmlns:ds="http://schemas.openxmlformats.org/officeDocument/2006/customXml" ds:itemID="{4FBDE712-7F9D-4A1B-8183-684BCD9655CC}">
   <ds:schemaRefs>
-    <ds:schemaRef ds:uri="http://schemas.microsoft.com/office/2006/metadata/properties"/>
-    <ds:schemaRef ds:uri="http://schemas.microsoft.com/office/infopath/2007/PartnerControls"/>
-    <ds:schemaRef ds:uri="71af3243-3dd4-4a8d-8c0d-dd76da1f02a5"/>
+    <ds:schemaRef ds:uri="http://schemas.microsoft.com/sharepoint/v3/contenttype/forms"/>
   </ds:schemaRefs>
 </ds:datastoreItem>
 </file>
</xml_diff>